<commit_message>
finial version of resequencing analysis to send to Pavitra
</commit_message>
<xml_diff>
--- a/workflow/notebooks/Resequencing-Pavitra-Summary.pptx
+++ b/workflow/notebooks/Resequencing-Pavitra-Summary.pptx
@@ -19,6 +19,7 @@
     <p:sldId id="267" r:id="rId13"/>
     <p:sldId id="268" r:id="rId14"/>
     <p:sldId id="269" r:id="rId15"/>
+    <p:sldId id="270" r:id="rId16"/>
   </p:sldIdLst>
   <p:sldSz cx="9144000" cy="6858000" type="screen4x3"/>
   <p:notesSz cx="6858000" cy="9144000"/>
@@ -3387,37 +3388,89 @@
           <a:chExt cx="0" cy="0"/>
         </a:xfrm>
       </p:grpSpPr>
-      <p:sp>
-        <p:nvSpPr>
-          <p:cNvPr id="3" name="Content Placeholder 2"/>
-          <p:cNvSpPr>
-            <a:spLocks noGrp="1"/>
-          </p:cNvSpPr>
-          <p:nvPr>
-            <p:ph idx="1"/>
-          </p:nvPr>
-        </p:nvSpPr>
-        <p:spPr/>
-        <p:txBody>
-          <a:bodyPr/>
-          <a:lstStyle/>
-          <a:p>
-            <a:pPr lvl="0" marL="0" indent="0">
-              <a:buNone/>
-            </a:pPr>
-            <a:r>
-              <a:rPr/>
-              <a:t>Here, I’ve plotted each replicate on the coordinates of the percent of SARS-CoV-2 reads in the initial library by the average coverage over the genome. It’s clear than some samples have huge differences between the coverage. For those with reasonably high % but few reads, we recommend sequencing from cDNA.</a:t>
-            </a:r>
-          </a:p>
-        </p:txBody>
-      </p:sp>
+      <p:pic>
+        <p:nvPicPr>
+          <p:cNvPr descr="Resequencing-Pavitra-Summary_files/figure-pptx/Replicate%20Disparity%202-1.png" id="0" name="Picture 1"/>
+          <p:cNvPicPr>
+            <a:picLocks noGrp="1" noChangeAspect="1"/>
+          </p:cNvPicPr>
+          <p:nvPr/>
+        </p:nvPicPr>
+        <p:blipFill>
+          <a:blip r:embed="rId2"/>
+          <a:stretch>
+            <a:fillRect/>
+          </a:stretch>
+        </p:blipFill>
+        <p:spPr bwMode="auto">
+          <a:xfrm>
+            <a:off x="2311400" y="1600200"/>
+            <a:ext cx="4521200" cy="4521200"/>
+          </a:xfrm>
+          <a:prstGeom prst="rect">
+            <a:avLst/>
+          </a:prstGeom>
+          <a:noFill/>
+          <a:ln w="9525">
+            <a:noFill/>
+            <a:headEnd/>
+            <a:tailEnd/>
+          </a:ln>
+        </p:spPr>
+      </p:pic>
     </p:spTree>
   </p:cSld>
 </p:sld>
 </file>
 
 <file path=ppt/slides/slide14.xml><?xml version="1.0" encoding="utf-8"?>
+<p:sld xmlns:a="http://schemas.openxmlformats.org/drawingml/2006/main" xmlns:r="http://schemas.openxmlformats.org/officeDocument/2006/relationships" xmlns:p="http://schemas.openxmlformats.org/presentationml/2006/main">
+  <p:cSld>
+    <p:spTree>
+      <p:nvGrpSpPr>
+        <p:cNvPr id="1" name=""/>
+        <p:cNvGrpSpPr/>
+        <p:nvPr/>
+      </p:nvGrpSpPr>
+      <p:grpSpPr>
+        <a:xfrm>
+          <a:off x="0" y="0"/>
+          <a:ext cx="0" cy="0"/>
+          <a:chOff x="0" y="0"/>
+          <a:chExt cx="0" cy="0"/>
+        </a:xfrm>
+      </p:grpSpPr>
+      <p:sp>
+        <p:nvSpPr>
+          <p:cNvPr id="3" name="Content Placeholder 2"/>
+          <p:cNvSpPr>
+            <a:spLocks noGrp="1"/>
+          </p:cNvSpPr>
+          <p:nvPr>
+            <p:ph idx="1"/>
+          </p:nvPr>
+        </p:nvSpPr>
+        <p:spPr/>
+        <p:txBody>
+          <a:bodyPr/>
+          <a:lstStyle/>
+          <a:p>
+            <a:pPr lvl="0" marL="0" indent="0">
+              <a:buNone/>
+            </a:pPr>
+            <a:r>
+              <a:rPr/>
+              <a:t>Here, I’ve plotted each replicate on the coordinates of the percent of SARS-CoV-2 reads in the initial library by the average coverage over the genome. It’s clear than some samples have huge differences between the coverage. For those with reasonably high % but few reads, we recommend sequencing from cDNA.</a:t>
+            </a:r>
+          </a:p>
+        </p:txBody>
+      </p:sp>
+    </p:spTree>
+  </p:cSld>
+</p:sld>
+</file>
+
+<file path=ppt/slides/slide15.xml><?xml version="1.0" encoding="utf-8"?>
 <p:sld xmlns:a="http://schemas.openxmlformats.org/drawingml/2006/main" xmlns:r="http://schemas.openxmlformats.org/officeDocument/2006/relationships" xmlns:p="http://schemas.openxmlformats.org/presentationml/2006/main">
   <p:cSld>
     <p:spTree>

</xml_diff>